<commit_message>
Learning Outcomes: Add LO-Interfaces
</commit_message>
<xml_diff>
--- a/doc/Diagrams.pptx
+++ b/doc/Diagrams.pptx
@@ -5,12 +5,13 @@
     <p:sldMasterId id="2147483648" r:id="rId1"/>
   </p:sldMasterIdLst>
   <p:notesMasterIdLst>
-    <p:notesMasterId r:id="rId5"/>
+    <p:notesMasterId r:id="rId6"/>
   </p:notesMasterIdLst>
   <p:sldIdLst>
     <p:sldId id="256" r:id="rId2"/>
     <p:sldId id="257" r:id="rId3"/>
-    <p:sldId id="258" r:id="rId4"/>
+    <p:sldId id="259" r:id="rId4"/>
+    <p:sldId id="258" r:id="rId5"/>
   </p:sldIdLst>
   <p:sldSz cx="9144000" cy="6858000" type="screen4x3"/>
   <p:notesSz cx="6858000" cy="9144000"/>
@@ -109,6 +110,22 @@
       </a:defRPr>
     </a:lvl9pPr>
   </p:defaultTextStyle>
+  <p:extLst>
+    <p:ext uri="{EFAFB233-063F-42B5-8137-9DF3F51BA10A}">
+      <p15:sldGuideLst xmlns:p15="http://schemas.microsoft.com/office/powerpoint/2012/main">
+        <p15:guide id="1" orient="horz" pos="2160">
+          <p15:clr>
+            <a:srgbClr val="A4A3A4"/>
+          </p15:clr>
+        </p15:guide>
+        <p15:guide id="2" pos="2880">
+          <p15:clr>
+            <a:srgbClr val="A4A3A4"/>
+          </p15:clr>
+        </p15:guide>
+      </p15:sldGuideLst>
+    </p:ext>
+  </p:extLst>
 </p:presentation>
 </file>
 
@@ -194,7 +211,7 @@
           <a:p>
             <a:fld id="{F5CC4B3F-88C1-4FFA-B1B6-F41C21DC6924}" type="datetimeFigureOut">
               <a:rPr lang="en-US" smtClean="0"/>
-              <a:t>9/27/2016</a:t>
+              <a:t>9/14/2017</a:t>
             </a:fld>
             <a:endParaRPr lang="en-US"/>
           </a:p>
@@ -727,7 +744,7 @@
           <a:p>
             <a:fld id="{78C97017-6FC3-485B-9764-EAC9E56C1D49}" type="datetimeFigureOut">
               <a:rPr lang="en-US" smtClean="0"/>
-              <a:t>9/27/2016</a:t>
+              <a:t>9/14/2017</a:t>
             </a:fld>
             <a:endParaRPr lang="en-US"/>
           </a:p>
@@ -897,7 +914,7 @@
           <a:p>
             <a:fld id="{78C97017-6FC3-485B-9764-EAC9E56C1D49}" type="datetimeFigureOut">
               <a:rPr lang="en-US" smtClean="0"/>
-              <a:t>9/27/2016</a:t>
+              <a:t>9/14/2017</a:t>
             </a:fld>
             <a:endParaRPr lang="en-US"/>
           </a:p>
@@ -1077,7 +1094,7 @@
           <a:p>
             <a:fld id="{78C97017-6FC3-485B-9764-EAC9E56C1D49}" type="datetimeFigureOut">
               <a:rPr lang="en-US" smtClean="0"/>
-              <a:t>9/27/2016</a:t>
+              <a:t>9/14/2017</a:t>
             </a:fld>
             <a:endParaRPr lang="en-US"/>
           </a:p>
@@ -1247,7 +1264,7 @@
           <a:p>
             <a:fld id="{78C97017-6FC3-485B-9764-EAC9E56C1D49}" type="datetimeFigureOut">
               <a:rPr lang="en-US" smtClean="0"/>
-              <a:t>9/27/2016</a:t>
+              <a:t>9/14/2017</a:t>
             </a:fld>
             <a:endParaRPr lang="en-US"/>
           </a:p>
@@ -1493,7 +1510,7 @@
           <a:p>
             <a:fld id="{78C97017-6FC3-485B-9764-EAC9E56C1D49}" type="datetimeFigureOut">
               <a:rPr lang="en-US" smtClean="0"/>
-              <a:t>9/27/2016</a:t>
+              <a:t>9/14/2017</a:t>
             </a:fld>
             <a:endParaRPr lang="en-US"/>
           </a:p>
@@ -1781,7 +1798,7 @@
           <a:p>
             <a:fld id="{78C97017-6FC3-485B-9764-EAC9E56C1D49}" type="datetimeFigureOut">
               <a:rPr lang="en-US" smtClean="0"/>
-              <a:t>9/27/2016</a:t>
+              <a:t>9/14/2017</a:t>
             </a:fld>
             <a:endParaRPr lang="en-US"/>
           </a:p>
@@ -2203,7 +2220,7 @@
           <a:p>
             <a:fld id="{78C97017-6FC3-485B-9764-EAC9E56C1D49}" type="datetimeFigureOut">
               <a:rPr lang="en-US" smtClean="0"/>
-              <a:t>9/27/2016</a:t>
+              <a:t>9/14/2017</a:t>
             </a:fld>
             <a:endParaRPr lang="en-US"/>
           </a:p>
@@ -2321,7 +2338,7 @@
           <a:p>
             <a:fld id="{78C97017-6FC3-485B-9764-EAC9E56C1D49}" type="datetimeFigureOut">
               <a:rPr lang="en-US" smtClean="0"/>
-              <a:t>9/27/2016</a:t>
+              <a:t>9/14/2017</a:t>
             </a:fld>
             <a:endParaRPr lang="en-US"/>
           </a:p>
@@ -2416,7 +2433,7 @@
           <a:p>
             <a:fld id="{78C97017-6FC3-485B-9764-EAC9E56C1D49}" type="datetimeFigureOut">
               <a:rPr lang="en-US" smtClean="0"/>
-              <a:t>9/27/2016</a:t>
+              <a:t>9/14/2017</a:t>
             </a:fld>
             <a:endParaRPr lang="en-US"/>
           </a:p>
@@ -2693,7 +2710,7 @@
           <a:p>
             <a:fld id="{78C97017-6FC3-485B-9764-EAC9E56C1D49}" type="datetimeFigureOut">
               <a:rPr lang="en-US" smtClean="0"/>
-              <a:t>9/27/2016</a:t>
+              <a:t>9/14/2017</a:t>
             </a:fld>
             <a:endParaRPr lang="en-US"/>
           </a:p>
@@ -2946,7 +2963,7 @@
           <a:p>
             <a:fld id="{78C97017-6FC3-485B-9764-EAC9E56C1D49}" type="datetimeFigureOut">
               <a:rPr lang="en-US" smtClean="0"/>
-              <a:t>9/27/2016</a:t>
+              <a:t>9/14/2017</a:t>
             </a:fld>
             <a:endParaRPr lang="en-US"/>
           </a:p>
@@ -3159,7 +3176,7 @@
           <a:p>
             <a:fld id="{78C97017-6FC3-485B-9764-EAC9E56C1D49}" type="datetimeFigureOut">
               <a:rPr lang="en-US" smtClean="0"/>
-              <a:t>9/27/2016</a:t>
+              <a:t>9/14/2017</a:t>
             </a:fld>
             <a:endParaRPr lang="en-US"/>
           </a:p>
@@ -6920,6 +6937,331 @@
       </p:grpSpPr>
       <p:sp>
         <p:nvSpPr>
+          <p:cNvPr id="2" name="Rectangle 18"/>
+          <p:cNvSpPr/>
+          <p:nvPr/>
+        </p:nvSpPr>
+        <p:spPr>
+          <a:xfrm>
+            <a:off x="6637708" y="4352685"/>
+            <a:ext cx="929296" cy="346760"/>
+          </a:xfrm>
+          <a:prstGeom prst="rect">
+            <a:avLst/>
+          </a:prstGeom>
+          <a:solidFill>
+            <a:srgbClr val="7030A0"/>
+          </a:solidFill>
+          <a:ln w="19050">
+            <a:solidFill>
+              <a:srgbClr val="7030A0"/>
+            </a:solidFill>
+          </a:ln>
+          <a:effectLst/>
+        </p:spPr>
+        <p:style>
+          <a:lnRef idx="1">
+            <a:schemeClr val="accent6"/>
+          </a:lnRef>
+          <a:fillRef idx="2">
+            <a:schemeClr val="accent6"/>
+          </a:fillRef>
+          <a:effectRef idx="1">
+            <a:schemeClr val="accent6"/>
+          </a:effectRef>
+          <a:fontRef idx="minor">
+            <a:schemeClr val="dk1"/>
+          </a:fontRef>
+        </p:style>
+        <p:txBody>
+          <a:bodyPr rtlCol="0" anchor="ctr"/>
+          <a:lstStyle/>
+          <a:p>
+            <a:pPr algn="ctr"/>
+            <a:r>
+              <a:rPr lang="en-US" sz="1050" dirty="0" smtClean="0">
+                <a:solidFill>
+                  <a:schemeClr val="bg1"/>
+                </a:solidFill>
+              </a:rPr>
+              <a:t>Person</a:t>
+            </a:r>
+            <a:endParaRPr lang="en-SG" sz="1050" dirty="0">
+              <a:solidFill>
+                <a:schemeClr val="bg1"/>
+              </a:solidFill>
+            </a:endParaRPr>
+          </a:p>
+        </p:txBody>
+      </p:sp>
+      <p:sp>
+        <p:nvSpPr>
+          <p:cNvPr id="3" name="Rectangle 128"/>
+          <p:cNvSpPr/>
+          <p:nvPr/>
+        </p:nvSpPr>
+        <p:spPr>
+          <a:xfrm>
+            <a:off x="6363802" y="5140408"/>
+            <a:ext cx="1408598" cy="346760"/>
+          </a:xfrm>
+          <a:prstGeom prst="rect">
+            <a:avLst/>
+          </a:prstGeom>
+          <a:ln w="19050"/>
+          <a:effectLst/>
+        </p:spPr>
+        <p:style>
+          <a:lnRef idx="1">
+            <a:schemeClr val="accent4"/>
+          </a:lnRef>
+          <a:fillRef idx="2">
+            <a:schemeClr val="accent4"/>
+          </a:fillRef>
+          <a:effectRef idx="1">
+            <a:schemeClr val="accent4"/>
+          </a:effectRef>
+          <a:fontRef idx="minor">
+            <a:schemeClr val="dk1"/>
+          </a:fontRef>
+        </p:style>
+        <p:txBody>
+          <a:bodyPr rtlCol="0" anchor="ctr"/>
+          <a:lstStyle/>
+          <a:p>
+            <a:pPr algn="ctr"/>
+            <a:r>
+              <a:rPr lang="en-US" sz="1050" dirty="0"/>
+              <a:t>&lt;&lt;interface&gt;&gt;</a:t>
+            </a:r>
+          </a:p>
+          <a:p>
+            <a:pPr algn="ctr"/>
+            <a:r>
+              <a:rPr lang="en-US" sz="1050" dirty="0" err="1"/>
+              <a:t>ReadOnlyPerson</a:t>
+            </a:r>
+            <a:endParaRPr lang="en-SG" sz="1050" dirty="0"/>
+          </a:p>
+        </p:txBody>
+      </p:sp>
+      <p:cxnSp>
+        <p:nvCxnSpPr>
+          <p:cNvPr id="4" name="Elbow Connector 131"/>
+          <p:cNvCxnSpPr>
+            <a:stCxn id="7" idx="2"/>
+            <a:endCxn id="3" idx="1"/>
+          </p:cNvCxnSpPr>
+          <p:nvPr/>
+        </p:nvCxnSpPr>
+        <p:spPr>
+          <a:xfrm rot="16200000" flipH="1">
+            <a:off x="5136573" y="4086558"/>
+            <a:ext cx="614343" cy="1840116"/>
+          </a:xfrm>
+          <a:prstGeom prst="bentConnector2">
+            <a:avLst/>
+          </a:prstGeom>
+          <a:ln w="19050">
+            <a:solidFill>
+              <a:srgbClr val="C00000"/>
+            </a:solidFill>
+            <a:prstDash val="dash"/>
+            <a:headEnd type="none" w="med" len="med"/>
+            <a:tailEnd type="arrow" w="med" len="med"/>
+          </a:ln>
+          <a:effectLst/>
+        </p:spPr>
+        <p:style>
+          <a:lnRef idx="1">
+            <a:schemeClr val="accent2"/>
+          </a:lnRef>
+          <a:fillRef idx="2">
+            <a:schemeClr val="accent2"/>
+          </a:fillRef>
+          <a:effectRef idx="1">
+            <a:schemeClr val="accent2"/>
+          </a:effectRef>
+          <a:fontRef idx="minor">
+            <a:schemeClr val="dk1"/>
+          </a:fontRef>
+        </p:style>
+      </p:cxnSp>
+      <p:sp>
+        <p:nvSpPr>
+          <p:cNvPr id="5" name="Isosceles Triangle 134"/>
+          <p:cNvSpPr/>
+          <p:nvPr/>
+        </p:nvSpPr>
+        <p:spPr>
+          <a:xfrm rot="10800000">
+            <a:off x="6964221" y="4953000"/>
+            <a:ext cx="270504" cy="175523"/>
+          </a:xfrm>
+          <a:prstGeom prst="triangle">
+            <a:avLst/>
+          </a:prstGeom>
+          <a:ln w="19050"/>
+          <a:effectLst/>
+        </p:spPr>
+        <p:style>
+          <a:lnRef idx="1">
+            <a:schemeClr val="accent4"/>
+          </a:lnRef>
+          <a:fillRef idx="2">
+            <a:schemeClr val="accent4"/>
+          </a:fillRef>
+          <a:effectRef idx="1">
+            <a:schemeClr val="accent4"/>
+          </a:effectRef>
+          <a:fontRef idx="minor">
+            <a:schemeClr val="dk1"/>
+          </a:fontRef>
+        </p:style>
+        <p:txBody>
+          <a:bodyPr rtlCol="0" anchor="ctr"/>
+          <a:lstStyle/>
+          <a:p>
+            <a:pPr algn="ctr"/>
+            <a:endParaRPr lang="en-SG" sz="1050"/>
+          </a:p>
+        </p:txBody>
+      </p:sp>
+      <p:cxnSp>
+        <p:nvCxnSpPr>
+          <p:cNvPr id="6" name="Elbow Connector 135"/>
+          <p:cNvCxnSpPr>
+            <a:stCxn id="2" idx="2"/>
+            <a:endCxn id="5" idx="3"/>
+          </p:cNvCxnSpPr>
+          <p:nvPr/>
+        </p:nvCxnSpPr>
+        <p:spPr>
+          <a:xfrm rot="5400000">
+            <a:off x="6974138" y="4824781"/>
+            <a:ext cx="253555" cy="2883"/>
+          </a:xfrm>
+          <a:prstGeom prst="bentConnector3">
+            <a:avLst>
+              <a:gd name="adj1" fmla="val 50000"/>
+            </a:avLst>
+          </a:prstGeom>
+          <a:ln w="19050">
+            <a:solidFill>
+              <a:srgbClr val="7030A0"/>
+            </a:solidFill>
+            <a:prstDash val="dash"/>
+            <a:headEnd type="none" w="med" len="med"/>
+            <a:tailEnd type="none" w="med" len="med"/>
+          </a:ln>
+          <a:effectLst/>
+        </p:spPr>
+        <p:style>
+          <a:lnRef idx="1">
+            <a:schemeClr val="accent6"/>
+          </a:lnRef>
+          <a:fillRef idx="2">
+            <a:schemeClr val="accent6"/>
+          </a:fillRef>
+          <a:effectRef idx="1">
+            <a:schemeClr val="accent6"/>
+          </a:effectRef>
+          <a:fontRef idx="minor">
+            <a:schemeClr val="dk1"/>
+          </a:fontRef>
+        </p:style>
+      </p:cxnSp>
+      <p:sp>
+        <p:nvSpPr>
+          <p:cNvPr id="7" name="Rectangle 62"/>
+          <p:cNvSpPr/>
+          <p:nvPr/>
+        </p:nvSpPr>
+        <p:spPr>
+          <a:xfrm>
+            <a:off x="3650593" y="4352685"/>
+            <a:ext cx="1746186" cy="346760"/>
+          </a:xfrm>
+          <a:prstGeom prst="rect">
+            <a:avLst/>
+          </a:prstGeom>
+          <a:solidFill>
+            <a:srgbClr val="C00000"/>
+          </a:solidFill>
+          <a:ln w="19050">
+            <a:solidFill>
+              <a:srgbClr val="C00000"/>
+            </a:solidFill>
+          </a:ln>
+          <a:effectLst/>
+        </p:spPr>
+        <p:style>
+          <a:lnRef idx="1">
+            <a:schemeClr val="accent2"/>
+          </a:lnRef>
+          <a:fillRef idx="2">
+            <a:schemeClr val="accent2"/>
+          </a:fillRef>
+          <a:effectRef idx="1">
+            <a:schemeClr val="accent2"/>
+          </a:effectRef>
+          <a:fontRef idx="minor">
+            <a:schemeClr val="dk1"/>
+          </a:fontRef>
+        </p:style>
+        <p:txBody>
+          <a:bodyPr rtlCol="0" anchor="ctr"/>
+          <a:lstStyle/>
+          <a:p>
+            <a:pPr algn="ctr"/>
+            <a:r>
+              <a:rPr lang="en-US" sz="1050" dirty="0" err="1">
+                <a:solidFill>
+                  <a:schemeClr val="bg1"/>
+                </a:solidFill>
+              </a:rPr>
+              <a:t>MainWindow</a:t>
+            </a:r>
+            <a:endParaRPr lang="en-SG" sz="1050" dirty="0">
+              <a:solidFill>
+                <a:schemeClr val="bg1"/>
+              </a:solidFill>
+            </a:endParaRPr>
+          </a:p>
+        </p:txBody>
+      </p:sp>
+    </p:spTree>
+    <p:extLst>
+      <p:ext uri="{BB962C8B-B14F-4D97-AF65-F5344CB8AC3E}">
+        <p14:creationId xmlns:p14="http://schemas.microsoft.com/office/powerpoint/2010/main" val="4275401693"/>
+      </p:ext>
+    </p:extLst>
+  </p:cSld>
+  <p:clrMapOvr>
+    <a:masterClrMapping/>
+  </p:clrMapOvr>
+</p:sld>
+</file>
+
+<file path=ppt/slides/slide4.xml><?xml version="1.0" encoding="utf-8"?>
+<p:sld xmlns:a="http://schemas.openxmlformats.org/drawingml/2006/main" xmlns:r="http://schemas.openxmlformats.org/officeDocument/2006/relationships" xmlns:p="http://schemas.openxmlformats.org/presentationml/2006/main">
+  <p:cSld>
+    <p:spTree>
+      <p:nvGrpSpPr>
+        <p:cNvPr id="1" name=""/>
+        <p:cNvGrpSpPr/>
+        <p:nvPr/>
+      </p:nvGrpSpPr>
+      <p:grpSpPr>
+        <a:xfrm>
+          <a:off x="0" y="0"/>
+          <a:ext cx="0" cy="0"/>
+          <a:chOff x="0" y="0"/>
+          <a:chExt cx="0" cy="0"/>
+        </a:xfrm>
+      </p:grpSpPr>
+      <p:sp>
+        <p:nvSpPr>
           <p:cNvPr id="2" name="Rectangle 22"/>
           <p:cNvSpPr/>
           <p:nvPr/>
@@ -8800,6 +9142,514 @@
           </a:fontRef>
         </p:style>
       </p:cxnSp>
+      <p:sp>
+        <p:nvSpPr>
+          <p:cNvPr id="44" name="Rectangle 6"/>
+          <p:cNvSpPr/>
+          <p:nvPr/>
+        </p:nvSpPr>
+        <p:spPr>
+          <a:xfrm>
+            <a:off x="6325375" y="1210641"/>
+            <a:ext cx="1868998" cy="327923"/>
+          </a:xfrm>
+          <a:prstGeom prst="rect">
+            <a:avLst/>
+          </a:prstGeom>
+          <a:ln w="19050"/>
+          <a:effectLst/>
+        </p:spPr>
+        <p:style>
+          <a:lnRef idx="1">
+            <a:schemeClr val="accent4"/>
+          </a:lnRef>
+          <a:fillRef idx="2">
+            <a:schemeClr val="accent4"/>
+          </a:fillRef>
+          <a:effectRef idx="1">
+            <a:schemeClr val="accent4"/>
+          </a:effectRef>
+          <a:fontRef idx="minor">
+            <a:schemeClr val="dk1"/>
+          </a:fontRef>
+        </p:style>
+        <p:txBody>
+          <a:bodyPr rtlCol="0" anchor="ctr"/>
+          <a:lstStyle/>
+          <a:p>
+            <a:pPr algn="ctr"/>
+            <a:r>
+              <a:rPr lang="en-SG" sz="1050" dirty="0" smtClean="0"/>
+              <a:t>&lt;&lt;interface&gt;&gt; Printable</a:t>
+            </a:r>
+            <a:endParaRPr lang="en-SG" sz="1050" dirty="0"/>
+          </a:p>
+        </p:txBody>
+      </p:sp>
+      <p:sp>
+        <p:nvSpPr>
+          <p:cNvPr id="47" name="Rectangle 19"/>
+          <p:cNvSpPr/>
+          <p:nvPr/>
+        </p:nvSpPr>
+        <p:spPr>
+          <a:xfrm>
+            <a:off x="4674519" y="1081001"/>
+            <a:ext cx="929296" cy="346760"/>
+          </a:xfrm>
+          <a:prstGeom prst="rect">
+            <a:avLst/>
+          </a:prstGeom>
+          <a:ln w="19050"/>
+          <a:effectLst/>
+        </p:spPr>
+        <p:style>
+          <a:lnRef idx="1">
+            <a:schemeClr val="accent4"/>
+          </a:lnRef>
+          <a:fillRef idx="2">
+            <a:schemeClr val="accent4"/>
+          </a:fillRef>
+          <a:effectRef idx="1">
+            <a:schemeClr val="accent4"/>
+          </a:effectRef>
+          <a:fontRef idx="minor">
+            <a:schemeClr val="dk1"/>
+          </a:fontRef>
+        </p:style>
+        <p:txBody>
+          <a:bodyPr rtlCol="0" anchor="ctr"/>
+          <a:lstStyle/>
+          <a:p>
+            <a:pPr algn="ctr"/>
+            <a:r>
+              <a:rPr lang="en-US" sz="1050" dirty="0" smtClean="0"/>
+              <a:t>Phone</a:t>
+            </a:r>
+            <a:endParaRPr lang="en-SG" sz="1050" dirty="0"/>
+          </a:p>
+        </p:txBody>
+      </p:sp>
+      <p:sp>
+        <p:nvSpPr>
+          <p:cNvPr id="48" name="Rectangle 20"/>
+          <p:cNvSpPr/>
+          <p:nvPr/>
+        </p:nvSpPr>
+        <p:spPr>
+          <a:xfrm>
+            <a:off x="4674519" y="1475988"/>
+            <a:ext cx="929296" cy="346760"/>
+          </a:xfrm>
+          <a:prstGeom prst="rect">
+            <a:avLst/>
+          </a:prstGeom>
+          <a:ln w="19050"/>
+          <a:effectLst/>
+        </p:spPr>
+        <p:style>
+          <a:lnRef idx="1">
+            <a:schemeClr val="accent4"/>
+          </a:lnRef>
+          <a:fillRef idx="2">
+            <a:schemeClr val="accent4"/>
+          </a:fillRef>
+          <a:effectRef idx="1">
+            <a:schemeClr val="accent4"/>
+          </a:effectRef>
+          <a:fontRef idx="minor">
+            <a:schemeClr val="dk1"/>
+          </a:fontRef>
+        </p:style>
+        <p:txBody>
+          <a:bodyPr rtlCol="0" anchor="ctr"/>
+          <a:lstStyle/>
+          <a:p>
+            <a:pPr algn="ctr"/>
+            <a:r>
+              <a:rPr lang="en-US" sz="1050" dirty="0" smtClean="0"/>
+              <a:t>Email</a:t>
+            </a:r>
+            <a:endParaRPr lang="en-SG" sz="1050" dirty="0"/>
+          </a:p>
+        </p:txBody>
+      </p:sp>
+      <p:sp>
+        <p:nvSpPr>
+          <p:cNvPr id="49" name="Rectangle 21"/>
+          <p:cNvSpPr/>
+          <p:nvPr/>
+        </p:nvSpPr>
+        <p:spPr>
+          <a:xfrm>
+            <a:off x="4674519" y="1870974"/>
+            <a:ext cx="929296" cy="346760"/>
+          </a:xfrm>
+          <a:prstGeom prst="rect">
+            <a:avLst/>
+          </a:prstGeom>
+          <a:ln w="19050"/>
+          <a:effectLst/>
+        </p:spPr>
+        <p:style>
+          <a:lnRef idx="1">
+            <a:schemeClr val="accent4"/>
+          </a:lnRef>
+          <a:fillRef idx="2">
+            <a:schemeClr val="accent4"/>
+          </a:fillRef>
+          <a:effectRef idx="1">
+            <a:schemeClr val="accent4"/>
+          </a:effectRef>
+          <a:fontRef idx="minor">
+            <a:schemeClr val="dk1"/>
+          </a:fontRef>
+        </p:style>
+        <p:txBody>
+          <a:bodyPr rtlCol="0" anchor="ctr"/>
+          <a:lstStyle/>
+          <a:p>
+            <a:pPr algn="ctr"/>
+            <a:r>
+              <a:rPr lang="en-US" sz="1050" dirty="0" smtClean="0"/>
+              <a:t>Address</a:t>
+            </a:r>
+            <a:endParaRPr lang="en-SG" sz="1050" dirty="0"/>
+          </a:p>
+        </p:txBody>
+      </p:sp>
+      <p:sp>
+        <p:nvSpPr>
+          <p:cNvPr id="50" name="Isosceles Triangle 24"/>
+          <p:cNvSpPr/>
+          <p:nvPr/>
+        </p:nvSpPr>
+        <p:spPr>
+          <a:xfrm rot="5400000">
+            <a:off x="6089483" y="1339999"/>
+            <a:ext cx="270504" cy="175523"/>
+          </a:xfrm>
+          <a:prstGeom prst="triangle">
+            <a:avLst/>
+          </a:prstGeom>
+          <a:ln w="19050"/>
+          <a:effectLst/>
+        </p:spPr>
+        <p:style>
+          <a:lnRef idx="1">
+            <a:schemeClr val="accent4"/>
+          </a:lnRef>
+          <a:fillRef idx="2">
+            <a:schemeClr val="accent4"/>
+          </a:fillRef>
+          <a:effectRef idx="1">
+            <a:schemeClr val="accent4"/>
+          </a:effectRef>
+          <a:fontRef idx="minor">
+            <a:schemeClr val="dk1"/>
+          </a:fontRef>
+        </p:style>
+        <p:txBody>
+          <a:bodyPr rtlCol="0" anchor="ctr"/>
+          <a:lstStyle/>
+          <a:p>
+            <a:pPr algn="ctr"/>
+            <a:endParaRPr lang="en-SG" sz="1050"/>
+          </a:p>
+        </p:txBody>
+      </p:sp>
+      <p:cxnSp>
+        <p:nvCxnSpPr>
+          <p:cNvPr id="51" name="Elbow Connector 25"/>
+          <p:cNvCxnSpPr>
+            <a:stCxn id="50" idx="3"/>
+            <a:endCxn id="48" idx="3"/>
+          </p:cNvCxnSpPr>
+          <p:nvPr/>
+        </p:nvCxnSpPr>
+        <p:spPr>
+          <a:xfrm rot="10800000" flipV="1">
+            <a:off x="5603816" y="1427760"/>
+            <a:ext cx="533159" cy="221607"/>
+          </a:xfrm>
+          <a:prstGeom prst="bentConnector3">
+            <a:avLst>
+              <a:gd name="adj1" fmla="val 50000"/>
+            </a:avLst>
+          </a:prstGeom>
+          <a:ln w="19050">
+            <a:prstDash val="dash"/>
+          </a:ln>
+          <a:effectLst/>
+        </p:spPr>
+        <p:style>
+          <a:lnRef idx="1">
+            <a:schemeClr val="accent4"/>
+          </a:lnRef>
+          <a:fillRef idx="2">
+            <a:schemeClr val="accent4"/>
+          </a:fillRef>
+          <a:effectRef idx="1">
+            <a:schemeClr val="accent4"/>
+          </a:effectRef>
+          <a:fontRef idx="minor">
+            <a:schemeClr val="dk1"/>
+          </a:fontRef>
+        </p:style>
+      </p:cxnSp>
+      <p:cxnSp>
+        <p:nvCxnSpPr>
+          <p:cNvPr id="52" name="Elbow Connector 26"/>
+          <p:cNvCxnSpPr>
+            <a:stCxn id="50" idx="3"/>
+            <a:endCxn id="47" idx="3"/>
+          </p:cNvCxnSpPr>
+          <p:nvPr/>
+        </p:nvCxnSpPr>
+        <p:spPr>
+          <a:xfrm rot="10800000">
+            <a:off x="5603816" y="1254381"/>
+            <a:ext cx="533159" cy="173380"/>
+          </a:xfrm>
+          <a:prstGeom prst="bentConnector3">
+            <a:avLst>
+              <a:gd name="adj1" fmla="val 50000"/>
+            </a:avLst>
+          </a:prstGeom>
+          <a:ln w="19050">
+            <a:prstDash val="dash"/>
+          </a:ln>
+          <a:effectLst/>
+        </p:spPr>
+        <p:style>
+          <a:lnRef idx="1">
+            <a:schemeClr val="accent4"/>
+          </a:lnRef>
+          <a:fillRef idx="2">
+            <a:schemeClr val="accent4"/>
+          </a:fillRef>
+          <a:effectRef idx="1">
+            <a:schemeClr val="accent4"/>
+          </a:effectRef>
+          <a:fontRef idx="minor">
+            <a:schemeClr val="dk1"/>
+          </a:fontRef>
+        </p:style>
+      </p:cxnSp>
+      <p:cxnSp>
+        <p:nvCxnSpPr>
+          <p:cNvPr id="53" name="Elbow Connector 29"/>
+          <p:cNvCxnSpPr>
+            <a:stCxn id="50" idx="3"/>
+            <a:endCxn id="49" idx="3"/>
+          </p:cNvCxnSpPr>
+          <p:nvPr/>
+        </p:nvCxnSpPr>
+        <p:spPr>
+          <a:xfrm rot="10800000" flipV="1">
+            <a:off x="5603816" y="1427760"/>
+            <a:ext cx="533159" cy="616593"/>
+          </a:xfrm>
+          <a:prstGeom prst="bentConnector3">
+            <a:avLst>
+              <a:gd name="adj1" fmla="val 50000"/>
+            </a:avLst>
+          </a:prstGeom>
+          <a:ln w="19050">
+            <a:prstDash val="dash"/>
+          </a:ln>
+          <a:effectLst/>
+        </p:spPr>
+        <p:style>
+          <a:lnRef idx="1">
+            <a:schemeClr val="accent4"/>
+          </a:lnRef>
+          <a:fillRef idx="2">
+            <a:schemeClr val="accent4"/>
+          </a:fillRef>
+          <a:effectRef idx="1">
+            <a:schemeClr val="accent4"/>
+          </a:effectRef>
+          <a:fontRef idx="minor">
+            <a:schemeClr val="dk1"/>
+          </a:fontRef>
+        </p:style>
+      </p:cxnSp>
+      <p:sp>
+        <p:nvSpPr>
+          <p:cNvPr id="54" name="Rectangle 21"/>
+          <p:cNvSpPr/>
+          <p:nvPr/>
+        </p:nvSpPr>
+        <p:spPr>
+          <a:xfrm>
+            <a:off x="4674519" y="686014"/>
+            <a:ext cx="929296" cy="346760"/>
+          </a:xfrm>
+          <a:prstGeom prst="rect">
+            <a:avLst/>
+          </a:prstGeom>
+          <a:ln w="19050"/>
+          <a:effectLst/>
+        </p:spPr>
+        <p:style>
+          <a:lnRef idx="1">
+            <a:schemeClr val="accent4"/>
+          </a:lnRef>
+          <a:fillRef idx="2">
+            <a:schemeClr val="accent4"/>
+          </a:fillRef>
+          <a:effectRef idx="1">
+            <a:schemeClr val="accent4"/>
+          </a:effectRef>
+          <a:fontRef idx="minor">
+            <a:schemeClr val="dk1"/>
+          </a:fontRef>
+        </p:style>
+        <p:txBody>
+          <a:bodyPr rtlCol="0" anchor="ctr"/>
+          <a:lstStyle/>
+          <a:p>
+            <a:pPr algn="ctr"/>
+            <a:r>
+              <a:rPr lang="en-US" sz="1050" dirty="0" smtClean="0"/>
+              <a:t>Name</a:t>
+            </a:r>
+            <a:endParaRPr lang="en-SG" sz="1050" dirty="0"/>
+          </a:p>
+        </p:txBody>
+      </p:sp>
+      <p:cxnSp>
+        <p:nvCxnSpPr>
+          <p:cNvPr id="55" name="Elbow Connector 26"/>
+          <p:cNvCxnSpPr>
+            <a:stCxn id="50" idx="3"/>
+            <a:endCxn id="54" idx="3"/>
+          </p:cNvCxnSpPr>
+          <p:nvPr/>
+        </p:nvCxnSpPr>
+        <p:spPr>
+          <a:xfrm rot="10800000">
+            <a:off x="5603816" y="859395"/>
+            <a:ext cx="533159" cy="568367"/>
+          </a:xfrm>
+          <a:prstGeom prst="bentConnector3">
+            <a:avLst>
+              <a:gd name="adj1" fmla="val 50000"/>
+            </a:avLst>
+          </a:prstGeom>
+          <a:ln w="19050">
+            <a:prstDash val="dash"/>
+          </a:ln>
+          <a:effectLst/>
+        </p:spPr>
+        <p:style>
+          <a:lnRef idx="1">
+            <a:schemeClr val="accent4"/>
+          </a:lnRef>
+          <a:fillRef idx="2">
+            <a:schemeClr val="accent4"/>
+          </a:fillRef>
+          <a:effectRef idx="1">
+            <a:schemeClr val="accent4"/>
+          </a:effectRef>
+          <a:fontRef idx="minor">
+            <a:schemeClr val="dk1"/>
+          </a:fontRef>
+        </p:style>
+      </p:cxnSp>
+      <p:sp>
+        <p:nvSpPr>
+          <p:cNvPr id="56" name="Rectangle 6"/>
+          <p:cNvSpPr/>
+          <p:nvPr/>
+        </p:nvSpPr>
+        <p:spPr>
+          <a:xfrm>
+            <a:off x="6325375" y="1538466"/>
+            <a:ext cx="1868998" cy="122745"/>
+          </a:xfrm>
+          <a:prstGeom prst="rect">
+            <a:avLst/>
+          </a:prstGeom>
+          <a:ln w="19050"/>
+          <a:effectLst/>
+        </p:spPr>
+        <p:style>
+          <a:lnRef idx="1">
+            <a:schemeClr val="accent4"/>
+          </a:lnRef>
+          <a:fillRef idx="2">
+            <a:schemeClr val="accent4"/>
+          </a:fillRef>
+          <a:effectRef idx="1">
+            <a:schemeClr val="accent4"/>
+          </a:effectRef>
+          <a:fontRef idx="minor">
+            <a:schemeClr val="dk1"/>
+          </a:fontRef>
+        </p:style>
+        <p:txBody>
+          <a:bodyPr rtlCol="0" anchor="ctr"/>
+          <a:lstStyle/>
+          <a:p>
+            <a:pPr algn="ctr"/>
+            <a:endParaRPr lang="en-SG" sz="1050" dirty="0"/>
+          </a:p>
+        </p:txBody>
+      </p:sp>
+      <p:sp>
+        <p:nvSpPr>
+          <p:cNvPr id="57" name="Rectangle 6"/>
+          <p:cNvSpPr/>
+          <p:nvPr/>
+        </p:nvSpPr>
+        <p:spPr>
+          <a:xfrm>
+            <a:off x="6325375" y="1656858"/>
+            <a:ext cx="1868998" cy="271943"/>
+          </a:xfrm>
+          <a:prstGeom prst="rect">
+            <a:avLst/>
+          </a:prstGeom>
+          <a:ln w="19050"/>
+          <a:effectLst/>
+        </p:spPr>
+        <p:style>
+          <a:lnRef idx="1">
+            <a:schemeClr val="accent4"/>
+          </a:lnRef>
+          <a:fillRef idx="2">
+            <a:schemeClr val="accent4"/>
+          </a:fillRef>
+          <a:effectRef idx="1">
+            <a:schemeClr val="accent4"/>
+          </a:effectRef>
+          <a:fontRef idx="minor">
+            <a:schemeClr val="dk1"/>
+          </a:fontRef>
+        </p:style>
+        <p:txBody>
+          <a:bodyPr rtlCol="0" anchor="ctr"/>
+          <a:lstStyle/>
+          <a:p>
+            <a:pPr algn="ctr"/>
+            <a:r>
+              <a:rPr lang="en-US" sz="1050" dirty="0" smtClean="0"/>
+              <a:t>+ </a:t>
+            </a:r>
+            <a:r>
+              <a:rPr lang="en-US" sz="1050" dirty="0" err="1" smtClean="0"/>
+              <a:t>getPrintableString</a:t>
+            </a:r>
+            <a:r>
+              <a:rPr lang="en-US" sz="1050" dirty="0" smtClean="0"/>
+              <a:t>(): String</a:t>
+            </a:r>
+            <a:endParaRPr lang="en-SG" sz="1050" dirty="0"/>
+          </a:p>
+        </p:txBody>
+      </p:sp>
     </p:spTree>
     <p:extLst>
       <p:ext uri="{BB962C8B-B14F-4D97-AF65-F5344CB8AC3E}">

</xml_diff>